<commit_message>
fix pt-PT template (#158)
</commit_message>
<xml_diff>
--- a/assets/pt_PT/new.pptx
+++ b/assets/pt_PT/new.pptx
@@ -14,7 +14,7 @@
   <p:notesSz cx="6858000" cy="9144000"/>
   <p:defaultTextStyle>
     <a:defPPr>
-      <a:defRPr lang="pt-BR"/>
+      <a:defRPr lang="pt-PT"/>
     </a:defPPr>
     <a:lvl1pPr marL="0" algn="l" defTabSz="914400" rtl="0" eaLnBrk="1" latinLnBrk="0" hangingPunct="1">
       <a:defRPr sz="1800" kern="1200">
@@ -167,7 +167,7 @@
             </a:lvl1pPr>
           </a:lstStyle>
           <a:p>
-            <a:endParaRPr lang="pt-BR"/>
+            <a:endParaRPr lang="pt-PT"/>
           </a:p>
         </p:txBody>
       </p:sp>
@@ -199,10 +199,10 @@
           </a:lstStyle>
           <a:p>
             <a:fld id="{3632E96E-41F7-40C5-8419-297958CC00FA}" type="datetimeFigureOut">
-              <a:rPr lang="pt-BR" smtClean="0"/>
+              <a:rPr lang="pt-PT" smtClean="0"/>
               <a:t>10/30/2013</a:t>
             </a:fld>
-            <a:endParaRPr lang="pt-BR"/>
+            <a:endParaRPr lang="pt-PT"/>
           </a:p>
         </p:txBody>
       </p:sp>
@@ -235,7 +235,7 @@
           <a:bodyPr vert="horz" lIns="91440" tIns="45720" rIns="91440" bIns="45720" rtlCol="0" anchor="ctr"/>
           <a:lstStyle/>
           <a:p>
-            <a:endParaRPr lang="pt-BR"/>
+            <a:endParaRPr lang="pt-PT"/>
           </a:p>
         </p:txBody>
       </p:sp>
@@ -264,38 +264,38 @@
           <a:p>
             <a:pPr lvl="0"/>
             <a:r>
-              <a:rPr lang="pt-BR" smtClean="0"/>
+              <a:rPr lang="pt-PT" smtClean="0"/>
               <a:t>Click to edit Master text styles</a:t>
             </a:r>
           </a:p>
           <a:p>
             <a:pPr lvl="1"/>
             <a:r>
-              <a:rPr lang="pt-BR" smtClean="0"/>
+              <a:rPr lang="pt-PT" smtClean="0"/>
               <a:t>Second level</a:t>
             </a:r>
           </a:p>
           <a:p>
             <a:pPr lvl="2"/>
             <a:r>
-              <a:rPr lang="pt-BR" smtClean="0"/>
+              <a:rPr lang="pt-PT" smtClean="0"/>
               <a:t>Third level</a:t>
             </a:r>
           </a:p>
           <a:p>
             <a:pPr lvl="3"/>
             <a:r>
-              <a:rPr lang="pt-BR" smtClean="0"/>
+              <a:rPr lang="pt-PT" smtClean="0"/>
               <a:t>Fourth level</a:t>
             </a:r>
           </a:p>
           <a:p>
             <a:pPr lvl="4"/>
             <a:r>
-              <a:rPr lang="pt-BR" smtClean="0"/>
+              <a:rPr lang="pt-PT" smtClean="0"/>
               <a:t>Fifth level</a:t>
             </a:r>
-            <a:endParaRPr lang="pt-BR"/>
+            <a:endParaRPr lang="pt-PT"/>
           </a:p>
         </p:txBody>
       </p:sp>
@@ -326,7 +326,7 @@
             </a:lvl1pPr>
           </a:lstStyle>
           <a:p>
-            <a:endParaRPr lang="pt-BR"/>
+            <a:endParaRPr lang="pt-PT"/>
           </a:p>
         </p:txBody>
       </p:sp>
@@ -358,10 +358,10 @@
           </a:lstStyle>
           <a:p>
             <a:fld id="{2E6999B8-B6B4-4561-A3CD-BBCDAB9FC9D9}" type="slidenum">
-              <a:rPr lang="pt-BR" smtClean="0"/>
+              <a:rPr lang="pt-PT" smtClean="0"/>
               <a:t>‹#›</a:t>
             </a:fld>
-            <a:endParaRPr lang="pt-BR"/>
+            <a:endParaRPr lang="pt-PT"/>
           </a:p>
         </p:txBody>
       </p:sp>
@@ -517,7 +517,7 @@
           <a:bodyPr/>
           <a:lstStyle/>
           <a:p>
-            <a:endParaRPr lang="pt-BR" dirty="0">
+            <a:endParaRPr lang="pt-PT" dirty="0">
               <a:latin typeface="Arial" panose="020B0604020202020204" pitchFamily="34" charset="0"/>
               <a:cs typeface="Arial" panose="020B0604020202020204" pitchFamily="34" charset="0"/>
             </a:endParaRPr>
@@ -540,10 +540,10 @@
           <a:lstStyle/>
           <a:p>
             <a:fld id="{2E6999B8-B6B4-4561-A3CD-BBCDAB9FC9D9}" type="slidenum">
-              <a:rPr lang="pt-BR" smtClean="0"/>
+              <a:rPr lang="pt-PT" smtClean="0"/>
               <a:t>1</a:t>
             </a:fld>
-            <a:endParaRPr lang="pt-BR"/>
+            <a:endParaRPr lang="pt-PT"/>
           </a:p>
         </p:txBody>
       </p:sp>
@@ -602,10 +602,10 @@
           </a:lstStyle>
           <a:p>
             <a:r>
-              <a:rPr lang="pt-BR" smtClean="0"/>
+              <a:rPr lang="pt-PT" smtClean="0"/>
               <a:t>Click to edit Master title style</a:t>
             </a:r>
-            <a:endParaRPr lang="pt-BR" dirty="0"/>
+            <a:endParaRPr lang="pt-PT" dirty="0"/>
           </a:p>
         </p:txBody>
       </p:sp>
@@ -667,10 +667,10 @@
           </a:lstStyle>
           <a:p>
             <a:r>
-              <a:rPr lang="pt-BR" smtClean="0"/>
+              <a:rPr lang="pt-PT" smtClean="0"/>
               <a:t>Click to edit Master subtitle style</a:t>
             </a:r>
-            <a:endParaRPr lang="pt-BR" dirty="0"/>
+            <a:endParaRPr lang="pt-PT" dirty="0"/>
           </a:p>
         </p:txBody>
       </p:sp>
@@ -690,10 +690,10 @@
           <a:lstStyle/>
           <a:p>
             <a:fld id="{BCC18F51-09EC-435C-A3BA-64A766E099C0}" type="datetimeFigureOut">
-              <a:rPr lang="pt-BR" smtClean="0"/>
+              <a:rPr lang="pt-PT" smtClean="0"/>
               <a:t>30.10.2013</a:t>
             </a:fld>
-            <a:endParaRPr lang="pt-BR"/>
+            <a:endParaRPr lang="pt-PT"/>
           </a:p>
         </p:txBody>
       </p:sp>
@@ -712,7 +712,7 @@
           <a:bodyPr/>
           <a:lstStyle/>
           <a:p>
-            <a:endParaRPr lang="pt-BR"/>
+            <a:endParaRPr lang="pt-PT"/>
           </a:p>
         </p:txBody>
       </p:sp>
@@ -732,10 +732,10 @@
           <a:lstStyle/>
           <a:p>
             <a:fld id="{08395586-F03A-48D1-94DF-16B239DF4FB5}" type="slidenum">
-              <a:rPr lang="pt-BR" smtClean="0"/>
+              <a:rPr lang="pt-PT" smtClean="0"/>
               <a:t>‹#›</a:t>
             </a:fld>
-            <a:endParaRPr lang="pt-BR"/>
+            <a:endParaRPr lang="pt-PT"/>
           </a:p>
         </p:txBody>
       </p:sp>
@@ -785,10 +785,10 @@
           <a:lstStyle/>
           <a:p>
             <a:r>
-              <a:rPr lang="pt-BR" smtClean="0"/>
+              <a:rPr lang="pt-PT" smtClean="0"/>
               <a:t>Click to edit Master title style</a:t>
             </a:r>
-            <a:endParaRPr lang="pt-BR" dirty="0"/>
+            <a:endParaRPr lang="pt-PT" dirty="0"/>
           </a:p>
         </p:txBody>
       </p:sp>
@@ -809,38 +809,38 @@
           <a:p>
             <a:pPr lvl="0"/>
             <a:r>
-              <a:rPr lang="pt-BR" smtClean="0"/>
+              <a:rPr lang="pt-PT" smtClean="0"/>
               <a:t>Click to edit Master text styles</a:t>
             </a:r>
           </a:p>
           <a:p>
             <a:pPr lvl="1"/>
             <a:r>
-              <a:rPr lang="pt-BR" smtClean="0"/>
+              <a:rPr lang="pt-PT" smtClean="0"/>
               <a:t>Second level</a:t>
             </a:r>
           </a:p>
           <a:p>
             <a:pPr lvl="2"/>
             <a:r>
-              <a:rPr lang="pt-BR" smtClean="0"/>
+              <a:rPr lang="pt-PT" smtClean="0"/>
               <a:t>Third level</a:t>
             </a:r>
           </a:p>
           <a:p>
             <a:pPr lvl="3"/>
             <a:r>
-              <a:rPr lang="pt-BR" smtClean="0"/>
+              <a:rPr lang="pt-PT" smtClean="0"/>
               <a:t>Fourth level</a:t>
             </a:r>
           </a:p>
           <a:p>
             <a:pPr lvl="4"/>
             <a:r>
-              <a:rPr lang="pt-BR" smtClean="0"/>
+              <a:rPr lang="pt-PT" smtClean="0"/>
               <a:t>Fifth level</a:t>
             </a:r>
-            <a:endParaRPr lang="pt-BR" dirty="0"/>
+            <a:endParaRPr lang="pt-PT" dirty="0"/>
           </a:p>
         </p:txBody>
       </p:sp>
@@ -860,10 +860,10 @@
           <a:lstStyle/>
           <a:p>
             <a:fld id="{BCC18F51-09EC-435C-A3BA-64A766E099C0}" type="datetimeFigureOut">
-              <a:rPr lang="pt-BR" smtClean="0"/>
+              <a:rPr lang="pt-PT" smtClean="0"/>
               <a:t>30.10.2013</a:t>
             </a:fld>
-            <a:endParaRPr lang="pt-BR"/>
+            <a:endParaRPr lang="pt-PT"/>
           </a:p>
         </p:txBody>
       </p:sp>
@@ -882,7 +882,7 @@
           <a:bodyPr/>
           <a:lstStyle/>
           <a:p>
-            <a:endParaRPr lang="pt-BR"/>
+            <a:endParaRPr lang="pt-PT"/>
           </a:p>
         </p:txBody>
       </p:sp>
@@ -902,10 +902,10 @@
           <a:lstStyle/>
           <a:p>
             <a:fld id="{08395586-F03A-48D1-94DF-16B239DF4FB5}" type="slidenum">
-              <a:rPr lang="pt-BR" smtClean="0"/>
+              <a:rPr lang="pt-PT" smtClean="0"/>
               <a:t>‹#›</a:t>
             </a:fld>
-            <a:endParaRPr lang="pt-BR"/>
+            <a:endParaRPr lang="pt-PT"/>
           </a:p>
         </p:txBody>
       </p:sp>
@@ -960,10 +960,10 @@
           <a:lstStyle/>
           <a:p>
             <a:r>
-              <a:rPr lang="pt-BR" smtClean="0"/>
+              <a:rPr lang="pt-PT" smtClean="0"/>
               <a:t>Click to edit Master title style</a:t>
             </a:r>
-            <a:endParaRPr lang="pt-BR" dirty="0"/>
+            <a:endParaRPr lang="pt-PT" dirty="0"/>
           </a:p>
         </p:txBody>
       </p:sp>
@@ -989,38 +989,38 @@
           <a:p>
             <a:pPr lvl="0"/>
             <a:r>
-              <a:rPr lang="pt-BR" smtClean="0"/>
+              <a:rPr lang="pt-PT" smtClean="0"/>
               <a:t>Click to edit Master text styles</a:t>
             </a:r>
           </a:p>
           <a:p>
             <a:pPr lvl="1"/>
             <a:r>
-              <a:rPr lang="pt-BR" smtClean="0"/>
+              <a:rPr lang="pt-PT" smtClean="0"/>
               <a:t>Second level</a:t>
             </a:r>
           </a:p>
           <a:p>
             <a:pPr lvl="2"/>
             <a:r>
-              <a:rPr lang="pt-BR" smtClean="0"/>
+              <a:rPr lang="pt-PT" smtClean="0"/>
               <a:t>Third level</a:t>
             </a:r>
           </a:p>
           <a:p>
             <a:pPr lvl="3"/>
             <a:r>
-              <a:rPr lang="pt-BR" smtClean="0"/>
+              <a:rPr lang="pt-PT" smtClean="0"/>
               <a:t>Fourth level</a:t>
             </a:r>
           </a:p>
           <a:p>
             <a:pPr lvl="4"/>
             <a:r>
-              <a:rPr lang="pt-BR" smtClean="0"/>
+              <a:rPr lang="pt-PT" smtClean="0"/>
               <a:t>Fifth level</a:t>
             </a:r>
-            <a:endParaRPr lang="pt-BR" dirty="0"/>
+            <a:endParaRPr lang="pt-PT" dirty="0"/>
           </a:p>
         </p:txBody>
       </p:sp>
@@ -1040,10 +1040,10 @@
           <a:lstStyle/>
           <a:p>
             <a:fld id="{BCC18F51-09EC-435C-A3BA-64A766E099C0}" type="datetimeFigureOut">
-              <a:rPr lang="pt-BR" smtClean="0"/>
+              <a:rPr lang="pt-PT" smtClean="0"/>
               <a:t>30.10.2013</a:t>
             </a:fld>
-            <a:endParaRPr lang="pt-BR"/>
+            <a:endParaRPr lang="pt-PT"/>
           </a:p>
         </p:txBody>
       </p:sp>
@@ -1062,7 +1062,7 @@
           <a:bodyPr/>
           <a:lstStyle/>
           <a:p>
-            <a:endParaRPr lang="pt-BR"/>
+            <a:endParaRPr lang="pt-PT"/>
           </a:p>
         </p:txBody>
       </p:sp>
@@ -1082,10 +1082,10 @@
           <a:lstStyle/>
           <a:p>
             <a:fld id="{08395586-F03A-48D1-94DF-16B239DF4FB5}" type="slidenum">
-              <a:rPr lang="pt-BR" smtClean="0"/>
+              <a:rPr lang="pt-PT" smtClean="0"/>
               <a:t>‹#›</a:t>
             </a:fld>
-            <a:endParaRPr lang="pt-BR"/>
+            <a:endParaRPr lang="pt-PT"/>
           </a:p>
         </p:txBody>
       </p:sp>
@@ -1135,10 +1135,10 @@
           <a:lstStyle/>
           <a:p>
             <a:r>
-              <a:rPr lang="pt-BR" smtClean="0"/>
+              <a:rPr lang="pt-PT" smtClean="0"/>
               <a:t>Click to edit Master title style</a:t>
             </a:r>
-            <a:endParaRPr lang="pt-BR" dirty="0"/>
+            <a:endParaRPr lang="pt-PT" dirty="0"/>
           </a:p>
         </p:txBody>
       </p:sp>
@@ -1159,38 +1159,38 @@
           <a:p>
             <a:pPr lvl="0"/>
             <a:r>
-              <a:rPr lang="pt-BR" smtClean="0"/>
+              <a:rPr lang="pt-PT" smtClean="0"/>
               <a:t>Click to edit Master text styles</a:t>
             </a:r>
           </a:p>
           <a:p>
             <a:pPr lvl="1"/>
             <a:r>
-              <a:rPr lang="pt-BR" smtClean="0"/>
+              <a:rPr lang="pt-PT" smtClean="0"/>
               <a:t>Second level</a:t>
             </a:r>
           </a:p>
           <a:p>
             <a:pPr lvl="2"/>
             <a:r>
-              <a:rPr lang="pt-BR" smtClean="0"/>
+              <a:rPr lang="pt-PT" smtClean="0"/>
               <a:t>Third level</a:t>
             </a:r>
           </a:p>
           <a:p>
             <a:pPr lvl="3"/>
             <a:r>
-              <a:rPr lang="pt-BR" smtClean="0"/>
+              <a:rPr lang="pt-PT" smtClean="0"/>
               <a:t>Fourth level</a:t>
             </a:r>
           </a:p>
           <a:p>
             <a:pPr lvl="4"/>
             <a:r>
-              <a:rPr lang="pt-BR" smtClean="0"/>
+              <a:rPr lang="pt-PT" smtClean="0"/>
               <a:t>Fifth level</a:t>
             </a:r>
-            <a:endParaRPr lang="pt-BR" dirty="0"/>
+            <a:endParaRPr lang="pt-PT" dirty="0"/>
           </a:p>
         </p:txBody>
       </p:sp>
@@ -1210,10 +1210,10 @@
           <a:lstStyle/>
           <a:p>
             <a:fld id="{BCC18F51-09EC-435C-A3BA-64A766E099C0}" type="datetimeFigureOut">
-              <a:rPr lang="pt-BR" smtClean="0"/>
+              <a:rPr lang="pt-PT" smtClean="0"/>
               <a:t>30.10.2013</a:t>
             </a:fld>
-            <a:endParaRPr lang="pt-BR"/>
+            <a:endParaRPr lang="pt-PT"/>
           </a:p>
         </p:txBody>
       </p:sp>
@@ -1232,7 +1232,7 @@
           <a:bodyPr/>
           <a:lstStyle/>
           <a:p>
-            <a:endParaRPr lang="pt-BR"/>
+            <a:endParaRPr lang="pt-PT"/>
           </a:p>
         </p:txBody>
       </p:sp>
@@ -1252,10 +1252,10 @@
           <a:lstStyle/>
           <a:p>
             <a:fld id="{08395586-F03A-48D1-94DF-16B239DF4FB5}" type="slidenum">
-              <a:rPr lang="pt-BR" smtClean="0"/>
+              <a:rPr lang="pt-PT" smtClean="0"/>
               <a:t>‹#›</a:t>
             </a:fld>
-            <a:endParaRPr lang="pt-BR"/>
+            <a:endParaRPr lang="pt-PT"/>
           </a:p>
         </p:txBody>
       </p:sp>
@@ -1314,10 +1314,10 @@
           </a:lstStyle>
           <a:p>
             <a:r>
-              <a:rPr lang="pt-BR" smtClean="0"/>
+              <a:rPr lang="pt-PT" smtClean="0"/>
               <a:t>Click to edit Master title style</a:t>
             </a:r>
-            <a:endParaRPr lang="pt-BR" dirty="0"/>
+            <a:endParaRPr lang="pt-PT" dirty="0"/>
           </a:p>
         </p:txBody>
       </p:sp>
@@ -1434,7 +1434,7 @@
           <a:p>
             <a:pPr lvl="0"/>
             <a:r>
-              <a:rPr lang="pt-BR" smtClean="0"/>
+              <a:rPr lang="pt-PT" smtClean="0"/>
               <a:t>Click to edit Master text styles</a:t>
             </a:r>
           </a:p>
@@ -1456,10 +1456,10 @@
           <a:lstStyle/>
           <a:p>
             <a:fld id="{BCC18F51-09EC-435C-A3BA-64A766E099C0}" type="datetimeFigureOut">
-              <a:rPr lang="pt-BR" smtClean="0"/>
+              <a:rPr lang="pt-PT" smtClean="0"/>
               <a:t>30.10.2013</a:t>
             </a:fld>
-            <a:endParaRPr lang="pt-BR"/>
+            <a:endParaRPr lang="pt-PT"/>
           </a:p>
         </p:txBody>
       </p:sp>
@@ -1478,7 +1478,7 @@
           <a:bodyPr/>
           <a:lstStyle/>
           <a:p>
-            <a:endParaRPr lang="pt-BR"/>
+            <a:endParaRPr lang="pt-PT"/>
           </a:p>
         </p:txBody>
       </p:sp>
@@ -1498,10 +1498,10 @@
           <a:lstStyle/>
           <a:p>
             <a:fld id="{08395586-F03A-48D1-94DF-16B239DF4FB5}" type="slidenum">
-              <a:rPr lang="pt-BR" smtClean="0"/>
+              <a:rPr lang="pt-PT" smtClean="0"/>
               <a:t>‹#›</a:t>
             </a:fld>
-            <a:endParaRPr lang="pt-BR"/>
+            <a:endParaRPr lang="pt-PT"/>
           </a:p>
         </p:txBody>
       </p:sp>
@@ -1551,10 +1551,10 @@
           <a:lstStyle/>
           <a:p>
             <a:r>
-              <a:rPr lang="pt-BR" smtClean="0"/>
+              <a:rPr lang="pt-PT" smtClean="0"/>
               <a:t>Click to edit Master title style</a:t>
             </a:r>
-            <a:endParaRPr lang="pt-BR" dirty="0"/>
+            <a:endParaRPr lang="pt-PT" dirty="0"/>
           </a:p>
         </p:txBody>
       </p:sp>
@@ -1580,38 +1580,38 @@
           <a:p>
             <a:pPr lvl="0"/>
             <a:r>
-              <a:rPr lang="pt-BR" smtClean="0"/>
+              <a:rPr lang="pt-PT" smtClean="0"/>
               <a:t>Click to edit Master text styles</a:t>
             </a:r>
           </a:p>
           <a:p>
             <a:pPr lvl="1"/>
             <a:r>
-              <a:rPr lang="pt-BR" smtClean="0"/>
+              <a:rPr lang="pt-PT" smtClean="0"/>
               <a:t>Second level</a:t>
             </a:r>
           </a:p>
           <a:p>
             <a:pPr lvl="2"/>
             <a:r>
-              <a:rPr lang="pt-BR" smtClean="0"/>
+              <a:rPr lang="pt-PT" smtClean="0"/>
               <a:t>Third level</a:t>
             </a:r>
           </a:p>
           <a:p>
             <a:pPr lvl="3"/>
             <a:r>
-              <a:rPr lang="pt-BR" smtClean="0"/>
+              <a:rPr lang="pt-PT" smtClean="0"/>
               <a:t>Fourth level</a:t>
             </a:r>
           </a:p>
           <a:p>
             <a:pPr lvl="4"/>
             <a:r>
-              <a:rPr lang="pt-BR" smtClean="0"/>
+              <a:rPr lang="pt-PT" smtClean="0"/>
               <a:t>Fifth level</a:t>
             </a:r>
-            <a:endParaRPr lang="pt-BR" dirty="0"/>
+            <a:endParaRPr lang="pt-PT" dirty="0"/>
           </a:p>
         </p:txBody>
       </p:sp>
@@ -1637,38 +1637,38 @@
           <a:p>
             <a:pPr lvl="0"/>
             <a:r>
-              <a:rPr lang="pt-BR" smtClean="0"/>
+              <a:rPr lang="pt-PT" smtClean="0"/>
               <a:t>Click to edit Master text styles</a:t>
             </a:r>
           </a:p>
           <a:p>
             <a:pPr lvl="1"/>
             <a:r>
-              <a:rPr lang="pt-BR" smtClean="0"/>
+              <a:rPr lang="pt-PT" smtClean="0"/>
               <a:t>Second level</a:t>
             </a:r>
           </a:p>
           <a:p>
             <a:pPr lvl="2"/>
             <a:r>
-              <a:rPr lang="pt-BR" smtClean="0"/>
+              <a:rPr lang="pt-PT" smtClean="0"/>
               <a:t>Third level</a:t>
             </a:r>
           </a:p>
           <a:p>
             <a:pPr lvl="3"/>
             <a:r>
-              <a:rPr lang="pt-BR" smtClean="0"/>
+              <a:rPr lang="pt-PT" smtClean="0"/>
               <a:t>Fourth level</a:t>
             </a:r>
           </a:p>
           <a:p>
             <a:pPr lvl="4"/>
             <a:r>
-              <a:rPr lang="pt-BR" smtClean="0"/>
+              <a:rPr lang="pt-PT" smtClean="0"/>
               <a:t>Fifth level</a:t>
             </a:r>
-            <a:endParaRPr lang="pt-BR" dirty="0"/>
+            <a:endParaRPr lang="pt-PT" dirty="0"/>
           </a:p>
         </p:txBody>
       </p:sp>
@@ -1688,10 +1688,10 @@
           <a:lstStyle/>
           <a:p>
             <a:fld id="{BCC18F51-09EC-435C-A3BA-64A766E099C0}" type="datetimeFigureOut">
-              <a:rPr lang="pt-BR" smtClean="0"/>
+              <a:rPr lang="pt-PT" smtClean="0"/>
               <a:t>30.10.2013</a:t>
             </a:fld>
-            <a:endParaRPr lang="pt-BR"/>
+            <a:endParaRPr lang="pt-PT"/>
           </a:p>
         </p:txBody>
       </p:sp>
@@ -1710,7 +1710,7 @@
           <a:bodyPr/>
           <a:lstStyle/>
           <a:p>
-            <a:endParaRPr lang="pt-BR"/>
+            <a:endParaRPr lang="pt-PT"/>
           </a:p>
         </p:txBody>
       </p:sp>
@@ -1730,10 +1730,10 @@
           <a:lstStyle/>
           <a:p>
             <a:fld id="{08395586-F03A-48D1-94DF-16B239DF4FB5}" type="slidenum">
-              <a:rPr lang="pt-BR" smtClean="0"/>
+              <a:rPr lang="pt-PT" smtClean="0"/>
               <a:t>‹#›</a:t>
             </a:fld>
-            <a:endParaRPr lang="pt-BR"/>
+            <a:endParaRPr lang="pt-PT"/>
           </a:p>
         </p:txBody>
       </p:sp>
@@ -1788,10 +1788,10 @@
           <a:lstStyle/>
           <a:p>
             <a:r>
-              <a:rPr lang="pt-BR" smtClean="0"/>
+              <a:rPr lang="pt-PT" smtClean="0"/>
               <a:t>Click to edit Master title style</a:t>
             </a:r>
-            <a:endParaRPr lang="pt-BR" dirty="0"/>
+            <a:endParaRPr lang="pt-PT" dirty="0"/>
           </a:p>
         </p:txBody>
       </p:sp>
@@ -1854,7 +1854,7 @@
           <a:p>
             <a:pPr lvl="0"/>
             <a:r>
-              <a:rPr lang="pt-BR" smtClean="0"/>
+              <a:rPr lang="pt-PT" smtClean="0"/>
               <a:t>Click to edit Master text styles</a:t>
             </a:r>
           </a:p>
@@ -1882,38 +1882,38 @@
           <a:p>
             <a:pPr lvl="0"/>
             <a:r>
-              <a:rPr lang="pt-BR" smtClean="0"/>
+              <a:rPr lang="pt-PT" smtClean="0"/>
               <a:t>Click to edit Master text styles</a:t>
             </a:r>
           </a:p>
           <a:p>
             <a:pPr lvl="1"/>
             <a:r>
-              <a:rPr lang="pt-BR" smtClean="0"/>
+              <a:rPr lang="pt-PT" smtClean="0"/>
               <a:t>Second level</a:t>
             </a:r>
           </a:p>
           <a:p>
             <a:pPr lvl="2"/>
             <a:r>
-              <a:rPr lang="pt-BR" smtClean="0"/>
+              <a:rPr lang="pt-PT" smtClean="0"/>
               <a:t>Third level</a:t>
             </a:r>
           </a:p>
           <a:p>
             <a:pPr lvl="3"/>
             <a:r>
-              <a:rPr lang="pt-BR" smtClean="0"/>
+              <a:rPr lang="pt-PT" smtClean="0"/>
               <a:t>Fourth level</a:t>
             </a:r>
           </a:p>
           <a:p>
             <a:pPr lvl="4"/>
             <a:r>
-              <a:rPr lang="pt-BR" smtClean="0"/>
+              <a:rPr lang="pt-PT" smtClean="0"/>
               <a:t>Fifth level</a:t>
             </a:r>
-            <a:endParaRPr lang="pt-BR" dirty="0"/>
+            <a:endParaRPr lang="pt-PT" dirty="0"/>
           </a:p>
         </p:txBody>
       </p:sp>
@@ -1976,7 +1976,7 @@
           <a:p>
             <a:pPr lvl="0"/>
             <a:r>
-              <a:rPr lang="pt-BR" smtClean="0"/>
+              <a:rPr lang="pt-PT" smtClean="0"/>
               <a:t>Click to edit Master text styles</a:t>
             </a:r>
           </a:p>
@@ -2004,38 +2004,38 @@
           <a:p>
             <a:pPr lvl="0"/>
             <a:r>
-              <a:rPr lang="pt-BR" smtClean="0"/>
+              <a:rPr lang="pt-PT" smtClean="0"/>
               <a:t>Click to edit Master text styles</a:t>
             </a:r>
           </a:p>
           <a:p>
             <a:pPr lvl="1"/>
             <a:r>
-              <a:rPr lang="pt-BR" smtClean="0"/>
+              <a:rPr lang="pt-PT" smtClean="0"/>
               <a:t>Second level</a:t>
             </a:r>
           </a:p>
           <a:p>
             <a:pPr lvl="2"/>
             <a:r>
-              <a:rPr lang="pt-BR" smtClean="0"/>
+              <a:rPr lang="pt-PT" smtClean="0"/>
               <a:t>Third level</a:t>
             </a:r>
           </a:p>
           <a:p>
             <a:pPr lvl="3"/>
             <a:r>
-              <a:rPr lang="pt-BR" smtClean="0"/>
+              <a:rPr lang="pt-PT" smtClean="0"/>
               <a:t>Fourth level</a:t>
             </a:r>
           </a:p>
           <a:p>
             <a:pPr lvl="4"/>
             <a:r>
-              <a:rPr lang="pt-BR" smtClean="0"/>
+              <a:rPr lang="pt-PT" smtClean="0"/>
               <a:t>Fifth level</a:t>
             </a:r>
-            <a:endParaRPr lang="pt-BR" dirty="0"/>
+            <a:endParaRPr lang="pt-PT" dirty="0"/>
           </a:p>
         </p:txBody>
       </p:sp>
@@ -2055,10 +2055,10 @@
           <a:lstStyle/>
           <a:p>
             <a:fld id="{BCC18F51-09EC-435C-A3BA-64A766E099C0}" type="datetimeFigureOut">
-              <a:rPr lang="pt-BR" smtClean="0"/>
+              <a:rPr lang="pt-PT" smtClean="0"/>
               <a:t>30.10.2013</a:t>
             </a:fld>
-            <a:endParaRPr lang="pt-BR"/>
+            <a:endParaRPr lang="pt-PT"/>
           </a:p>
         </p:txBody>
       </p:sp>
@@ -2077,7 +2077,7 @@
           <a:bodyPr/>
           <a:lstStyle/>
           <a:p>
-            <a:endParaRPr lang="pt-BR"/>
+            <a:endParaRPr lang="pt-PT"/>
           </a:p>
         </p:txBody>
       </p:sp>
@@ -2097,10 +2097,10 @@
           <a:lstStyle/>
           <a:p>
             <a:fld id="{08395586-F03A-48D1-94DF-16B239DF4FB5}" type="slidenum">
-              <a:rPr lang="pt-BR" smtClean="0"/>
+              <a:rPr lang="pt-PT" smtClean="0"/>
               <a:t>‹#›</a:t>
             </a:fld>
-            <a:endParaRPr lang="pt-BR"/>
+            <a:endParaRPr lang="pt-PT"/>
           </a:p>
         </p:txBody>
       </p:sp>
@@ -2150,10 +2150,10 @@
           <a:lstStyle/>
           <a:p>
             <a:r>
-              <a:rPr lang="pt-BR" smtClean="0"/>
+              <a:rPr lang="pt-PT" smtClean="0"/>
               <a:t>Click to edit Master title style</a:t>
             </a:r>
-            <a:endParaRPr lang="pt-BR" dirty="0"/>
+            <a:endParaRPr lang="pt-PT" dirty="0"/>
           </a:p>
         </p:txBody>
       </p:sp>
@@ -2173,10 +2173,10 @@
           <a:lstStyle/>
           <a:p>
             <a:fld id="{BCC18F51-09EC-435C-A3BA-64A766E099C0}" type="datetimeFigureOut">
-              <a:rPr lang="pt-BR" smtClean="0"/>
+              <a:rPr lang="pt-PT" smtClean="0"/>
               <a:t>30.10.2013</a:t>
             </a:fld>
-            <a:endParaRPr lang="pt-BR"/>
+            <a:endParaRPr lang="pt-PT"/>
           </a:p>
         </p:txBody>
       </p:sp>
@@ -2195,7 +2195,7 @@
           <a:bodyPr/>
           <a:lstStyle/>
           <a:p>
-            <a:endParaRPr lang="pt-BR"/>
+            <a:endParaRPr lang="pt-PT"/>
           </a:p>
         </p:txBody>
       </p:sp>
@@ -2215,10 +2215,10 @@
           <a:lstStyle/>
           <a:p>
             <a:fld id="{08395586-F03A-48D1-94DF-16B239DF4FB5}" type="slidenum">
-              <a:rPr lang="pt-BR" smtClean="0"/>
+              <a:rPr lang="pt-PT" smtClean="0"/>
               <a:t>‹#›</a:t>
             </a:fld>
-            <a:endParaRPr lang="pt-BR"/>
+            <a:endParaRPr lang="pt-PT"/>
           </a:p>
         </p:txBody>
       </p:sp>
@@ -2268,10 +2268,10 @@
           <a:lstStyle/>
           <a:p>
             <a:fld id="{BCC18F51-09EC-435C-A3BA-64A766E099C0}" type="datetimeFigureOut">
-              <a:rPr lang="pt-BR" smtClean="0"/>
+              <a:rPr lang="pt-PT" smtClean="0"/>
               <a:t>30.10.2013</a:t>
             </a:fld>
-            <a:endParaRPr lang="pt-BR"/>
+            <a:endParaRPr lang="pt-PT"/>
           </a:p>
         </p:txBody>
       </p:sp>
@@ -2290,7 +2290,7 @@
           <a:bodyPr/>
           <a:lstStyle/>
           <a:p>
-            <a:endParaRPr lang="pt-BR"/>
+            <a:endParaRPr lang="pt-PT"/>
           </a:p>
         </p:txBody>
       </p:sp>
@@ -2310,10 +2310,10 @@
           <a:lstStyle/>
           <a:p>
             <a:fld id="{08395586-F03A-48D1-94DF-16B239DF4FB5}" type="slidenum">
-              <a:rPr lang="pt-BR" smtClean="0"/>
+              <a:rPr lang="pt-PT" smtClean="0"/>
               <a:t>‹#›</a:t>
             </a:fld>
-            <a:endParaRPr lang="pt-BR"/>
+            <a:endParaRPr lang="pt-PT"/>
           </a:p>
         </p:txBody>
       </p:sp>
@@ -2372,10 +2372,10 @@
           </a:lstStyle>
           <a:p>
             <a:r>
-              <a:rPr lang="pt-BR" smtClean="0"/>
+              <a:rPr lang="pt-PT" smtClean="0"/>
               <a:t>Click to edit Master title style</a:t>
             </a:r>
-            <a:endParaRPr lang="pt-BR" dirty="0"/>
+            <a:endParaRPr lang="pt-PT" dirty="0"/>
           </a:p>
         </p:txBody>
       </p:sp>
@@ -2429,38 +2429,38 @@
           <a:p>
             <a:pPr lvl="0"/>
             <a:r>
-              <a:rPr lang="pt-BR" smtClean="0"/>
+              <a:rPr lang="pt-PT" smtClean="0"/>
               <a:t>Click to edit Master text styles</a:t>
             </a:r>
           </a:p>
           <a:p>
             <a:pPr lvl="1"/>
             <a:r>
-              <a:rPr lang="pt-BR" smtClean="0"/>
+              <a:rPr lang="pt-PT" smtClean="0"/>
               <a:t>Second level</a:t>
             </a:r>
           </a:p>
           <a:p>
             <a:pPr lvl="2"/>
             <a:r>
-              <a:rPr lang="pt-BR" smtClean="0"/>
+              <a:rPr lang="pt-PT" smtClean="0"/>
               <a:t>Third level</a:t>
             </a:r>
           </a:p>
           <a:p>
             <a:pPr lvl="3"/>
             <a:r>
-              <a:rPr lang="pt-BR" smtClean="0"/>
+              <a:rPr lang="pt-PT" smtClean="0"/>
               <a:t>Fourth level</a:t>
             </a:r>
           </a:p>
           <a:p>
             <a:pPr lvl="4"/>
             <a:r>
-              <a:rPr lang="pt-BR" smtClean="0"/>
+              <a:rPr lang="pt-PT" smtClean="0"/>
               <a:t>Fifth level</a:t>
             </a:r>
-            <a:endParaRPr lang="pt-BR" dirty="0"/>
+            <a:endParaRPr lang="pt-PT" dirty="0"/>
           </a:p>
         </p:txBody>
       </p:sp>
@@ -2523,7 +2523,7 @@
           <a:p>
             <a:pPr lvl="0"/>
             <a:r>
-              <a:rPr lang="pt-BR" smtClean="0"/>
+              <a:rPr lang="pt-PT" smtClean="0"/>
               <a:t>Click to edit Master text styles</a:t>
             </a:r>
           </a:p>
@@ -2545,10 +2545,10 @@
           <a:lstStyle/>
           <a:p>
             <a:fld id="{BCC18F51-09EC-435C-A3BA-64A766E099C0}" type="datetimeFigureOut">
-              <a:rPr lang="pt-BR" smtClean="0"/>
+              <a:rPr lang="pt-PT" smtClean="0"/>
               <a:t>30.10.2013</a:t>
             </a:fld>
-            <a:endParaRPr lang="pt-BR"/>
+            <a:endParaRPr lang="pt-PT"/>
           </a:p>
         </p:txBody>
       </p:sp>
@@ -2567,7 +2567,7 @@
           <a:bodyPr/>
           <a:lstStyle/>
           <a:p>
-            <a:endParaRPr lang="pt-BR"/>
+            <a:endParaRPr lang="pt-PT"/>
           </a:p>
         </p:txBody>
       </p:sp>
@@ -2587,10 +2587,10 @@
           <a:lstStyle/>
           <a:p>
             <a:fld id="{08395586-F03A-48D1-94DF-16B239DF4FB5}" type="slidenum">
-              <a:rPr lang="pt-BR" smtClean="0"/>
+              <a:rPr lang="pt-PT" smtClean="0"/>
               <a:t>‹#›</a:t>
             </a:fld>
-            <a:endParaRPr lang="pt-BR"/>
+            <a:endParaRPr lang="pt-PT"/>
           </a:p>
         </p:txBody>
       </p:sp>
@@ -2649,10 +2649,10 @@
           </a:lstStyle>
           <a:p>
             <a:r>
-              <a:rPr lang="pt-BR" smtClean="0"/>
+              <a:rPr lang="pt-PT" smtClean="0"/>
               <a:t>Click to edit Master title style</a:t>
             </a:r>
-            <a:endParaRPr lang="pt-BR" dirty="0"/>
+            <a:endParaRPr lang="pt-PT" dirty="0"/>
           </a:p>
         </p:txBody>
       </p:sp>
@@ -2714,10 +2714,10 @@
           </a:lstStyle>
           <a:p>
             <a:r>
-              <a:rPr lang="pt-BR" smtClean="0"/>
+              <a:rPr lang="pt-PT" smtClean="0"/>
               <a:t>Click icon to add picture</a:t>
             </a:r>
-            <a:endParaRPr lang="pt-BR" dirty="0"/>
+            <a:endParaRPr lang="pt-PT" dirty="0"/>
           </a:p>
         </p:txBody>
       </p:sp>
@@ -2780,7 +2780,7 @@
           <a:p>
             <a:pPr lvl="0"/>
             <a:r>
-              <a:rPr lang="pt-BR" smtClean="0"/>
+              <a:rPr lang="pt-PT" smtClean="0"/>
               <a:t>Click to edit Master text styles</a:t>
             </a:r>
           </a:p>
@@ -2802,10 +2802,10 @@
           <a:lstStyle/>
           <a:p>
             <a:fld id="{BCC18F51-09EC-435C-A3BA-64A766E099C0}" type="datetimeFigureOut">
-              <a:rPr lang="pt-BR" smtClean="0"/>
+              <a:rPr lang="pt-PT" smtClean="0"/>
               <a:t>30.10.2013</a:t>
             </a:fld>
-            <a:endParaRPr lang="pt-BR"/>
+            <a:endParaRPr lang="pt-PT"/>
           </a:p>
         </p:txBody>
       </p:sp>
@@ -2824,7 +2824,7 @@
           <a:bodyPr/>
           <a:lstStyle/>
           <a:p>
-            <a:endParaRPr lang="pt-BR"/>
+            <a:endParaRPr lang="pt-PT"/>
           </a:p>
         </p:txBody>
       </p:sp>
@@ -2844,10 +2844,10 @@
           <a:lstStyle/>
           <a:p>
             <a:fld id="{08395586-F03A-48D1-94DF-16B239DF4FB5}" type="slidenum">
-              <a:rPr lang="pt-BR" smtClean="0"/>
+              <a:rPr lang="pt-PT" smtClean="0"/>
               <a:t>‹#›</a:t>
             </a:fld>
-            <a:endParaRPr lang="pt-BR"/>
+            <a:endParaRPr lang="pt-PT"/>
           </a:p>
         </p:txBody>
       </p:sp>
@@ -2912,10 +2912,10 @@
           <a:lstStyle/>
           <a:p>
             <a:r>
-              <a:rPr lang="pt-BR" smtClean="0"/>
+              <a:rPr lang="pt-PT" smtClean="0"/>
               <a:t>Click to edit Master title style</a:t>
             </a:r>
-            <a:endParaRPr lang="pt-BR" dirty="0"/>
+            <a:endParaRPr lang="pt-PT" dirty="0"/>
           </a:p>
         </p:txBody>
       </p:sp>
@@ -2946,38 +2946,38 @@
           <a:p>
             <a:pPr lvl="0"/>
             <a:r>
-              <a:rPr lang="pt-BR" smtClean="0"/>
+              <a:rPr lang="pt-PT" smtClean="0"/>
               <a:t>Click to edit Master text styles</a:t>
             </a:r>
           </a:p>
           <a:p>
             <a:pPr lvl="1"/>
             <a:r>
-              <a:rPr lang="pt-BR" smtClean="0"/>
+              <a:rPr lang="pt-PT" smtClean="0"/>
               <a:t>Second level</a:t>
             </a:r>
           </a:p>
           <a:p>
             <a:pPr lvl="2"/>
             <a:r>
-              <a:rPr lang="pt-BR" smtClean="0"/>
+              <a:rPr lang="pt-PT" smtClean="0"/>
               <a:t>Third level</a:t>
             </a:r>
           </a:p>
           <a:p>
             <a:pPr lvl="3"/>
             <a:r>
-              <a:rPr lang="pt-BR" smtClean="0"/>
+              <a:rPr lang="pt-PT" smtClean="0"/>
               <a:t>Fourth level</a:t>
             </a:r>
           </a:p>
           <a:p>
             <a:pPr lvl="4"/>
             <a:r>
-              <a:rPr lang="pt-BR" smtClean="0"/>
+              <a:rPr lang="pt-PT" smtClean="0"/>
               <a:t>Fifth level</a:t>
             </a:r>
-            <a:endParaRPr lang="pt-BR" dirty="0"/>
+            <a:endParaRPr lang="pt-PT" dirty="0"/>
           </a:p>
         </p:txBody>
       </p:sp>
@@ -3015,10 +3015,10 @@
           </a:lstStyle>
           <a:p>
             <a:fld id="{BCC18F51-09EC-435C-A3BA-64A766E099C0}" type="datetimeFigureOut">
-              <a:rPr lang="pt-BR" smtClean="0"/>
+              <a:rPr lang="pt-PT" smtClean="0"/>
               <a:t>30.10.2013</a:t>
             </a:fld>
-            <a:endParaRPr lang="pt-BR"/>
+            <a:endParaRPr lang="pt-PT"/>
           </a:p>
         </p:txBody>
       </p:sp>
@@ -3055,7 +3055,7 @@
             </a:lvl1pPr>
           </a:lstStyle>
           <a:p>
-            <a:endParaRPr lang="pt-BR"/>
+            <a:endParaRPr lang="pt-PT"/>
           </a:p>
         </p:txBody>
       </p:sp>
@@ -3093,10 +3093,10 @@
           </a:lstStyle>
           <a:p>
             <a:fld id="{08395586-F03A-48D1-94DF-16B239DF4FB5}" type="slidenum">
-              <a:rPr lang="pt-BR" smtClean="0"/>
+              <a:rPr lang="pt-PT" smtClean="0"/>
               <a:t>‹#›</a:t>
             </a:fld>
-            <a:endParaRPr lang="pt-BR"/>
+            <a:endParaRPr lang="pt-PT"/>
           </a:p>
         </p:txBody>
       </p:sp>
@@ -3307,7 +3307,7 @@
     </p:bodyStyle>
     <p:otherStyle>
       <a:defPPr>
-        <a:defRPr lang="pt-BR"/>
+        <a:defRPr lang="pt-PT"/>
       </a:defPPr>
       <a:lvl1pPr marL="0" algn="l" defTabSz="914400" rtl="0" eaLnBrk="1" latinLnBrk="0" hangingPunct="1">
         <a:defRPr sz="1800" kern="1200">
@@ -3436,7 +3436,7 @@
           <a:bodyPr/>
           <a:lstStyle/>
           <a:p>
-            <a:endParaRPr lang="pt-BR" dirty="0"/>
+            <a:endParaRPr lang="pt-PT" dirty="0"/>
           </a:p>
         </p:txBody>
       </p:sp>
@@ -3455,7 +3455,7 @@
           <a:bodyPr/>
           <a:lstStyle/>
           <a:p>
-            <a:endParaRPr lang="pt-BR" dirty="0"/>
+            <a:endParaRPr lang="pt-PT" dirty="0"/>
           </a:p>
         </p:txBody>
       </p:sp>

</xml_diff>